<commit_message>
created parent lootbox SC and  updated the others SC
</commit_message>
<xml_diff>
--- a/lootbox/art/creations.pptx
+++ b/lootbox/art/creations.pptx
@@ -6,6 +6,7 @@
   </p:sldMasterIdLst>
   <p:sldIdLst>
     <p:sldId id="256" r:id="rId2"/>
+    <p:sldId id="257" r:id="rId3"/>
   </p:sldIdLst>
   <p:sldSz cx="12192000" cy="6858000"/>
   <p:notesSz cx="6858000" cy="9144000"/>
@@ -3817,6 +3818,262 @@
 </p:sld>
 </file>
 
+<file path=ppt/slides/slide2.xml><?xml version="1.0" encoding="utf-8"?>
+<p:sld xmlns:a="http://schemas.openxmlformats.org/drawingml/2006/main" xmlns:r="http://schemas.openxmlformats.org/officeDocument/2006/relationships" xmlns:p="http://schemas.openxmlformats.org/presentationml/2006/main">
+  <p:cSld>
+    <p:spTree>
+      <p:nvGrpSpPr>
+        <p:cNvPr id="1" name=""/>
+        <p:cNvGrpSpPr/>
+        <p:nvPr/>
+      </p:nvGrpSpPr>
+      <p:grpSpPr>
+        <a:xfrm>
+          <a:off x="0" y="0"/>
+          <a:ext cx="0" cy="0"/>
+          <a:chOff x="0" y="0"/>
+          <a:chExt cx="0" cy="0"/>
+        </a:xfrm>
+      </p:grpSpPr>
+      <p:sp>
+        <p:nvSpPr>
+          <p:cNvPr id="4" name="Rectangle 3">
+            <a:extLst>
+              <a:ext uri="{FF2B5EF4-FFF2-40B4-BE49-F238E27FC236}">
+                <a16:creationId xmlns:a16="http://schemas.microsoft.com/office/drawing/2014/main" id="{57126194-7716-7AF4-E5C6-614B200DBA55}"/>
+              </a:ext>
+            </a:extLst>
+          </p:cNvPr>
+          <p:cNvSpPr/>
+          <p:nvPr/>
+        </p:nvSpPr>
+        <p:spPr>
+          <a:xfrm>
+            <a:off x="1070516" y="591015"/>
+            <a:ext cx="2297151" cy="1031487"/>
+          </a:xfrm>
+          <a:prstGeom prst="rect">
+            <a:avLst/>
+          </a:prstGeom>
+          <a:noFill/>
+        </p:spPr>
+        <p:style>
+          <a:lnRef idx="2">
+            <a:schemeClr val="accent1">
+              <a:shade val="50000"/>
+            </a:schemeClr>
+          </a:lnRef>
+          <a:fillRef idx="1">
+            <a:schemeClr val="accent1"/>
+          </a:fillRef>
+          <a:effectRef idx="0">
+            <a:schemeClr val="accent1"/>
+          </a:effectRef>
+          <a:fontRef idx="minor">
+            <a:schemeClr val="lt1"/>
+          </a:fontRef>
+        </p:style>
+        <p:txBody>
+          <a:bodyPr rtlCol="0" anchor="ctr"/>
+          <a:lstStyle/>
+          <a:p>
+            <a:pPr algn="ctr"/>
+            <a:r>
+              <a:rPr lang="en-US" dirty="0" err="1">
+                <a:solidFill>
+                  <a:schemeClr val="tx1"/>
+                </a:solidFill>
+              </a:rPr>
+              <a:t>Lootbox</a:t>
+            </a:r>
+            <a:r>
+              <a:rPr lang="en-US" dirty="0">
+                <a:solidFill>
+                  <a:schemeClr val="tx1"/>
+                </a:solidFill>
+              </a:rPr>
+              <a:t> collection</a:t>
+            </a:r>
+          </a:p>
+          <a:p>
+            <a:pPr algn="ctr"/>
+            <a:r>
+              <a:rPr lang="en-US" dirty="0">
+                <a:solidFill>
+                  <a:schemeClr val="tx1"/>
+                </a:solidFill>
+              </a:rPr>
+              <a:t>random-value</a:t>
+            </a:r>
+          </a:p>
+        </p:txBody>
+      </p:sp>
+      <p:sp>
+        <p:nvSpPr>
+          <p:cNvPr id="5" name="Rectangle 4">
+            <a:extLst>
+              <a:ext uri="{FF2B5EF4-FFF2-40B4-BE49-F238E27FC236}">
+                <a16:creationId xmlns:a16="http://schemas.microsoft.com/office/drawing/2014/main" id="{993E884E-80EA-2B45-9374-0E678006BBAB}"/>
+              </a:ext>
+            </a:extLst>
+          </p:cNvPr>
+          <p:cNvSpPr/>
+          <p:nvPr/>
+        </p:nvSpPr>
+        <p:spPr>
+          <a:xfrm>
+            <a:off x="5454803" y="591014"/>
+            <a:ext cx="2429107" cy="1031487"/>
+          </a:xfrm>
+          <a:prstGeom prst="rect">
+            <a:avLst/>
+          </a:prstGeom>
+          <a:noFill/>
+        </p:spPr>
+        <p:style>
+          <a:lnRef idx="2">
+            <a:schemeClr val="accent1">
+              <a:shade val="50000"/>
+            </a:schemeClr>
+          </a:lnRef>
+          <a:fillRef idx="1">
+            <a:schemeClr val="accent1"/>
+          </a:fillRef>
+          <a:effectRef idx="0">
+            <a:schemeClr val="accent1"/>
+          </a:effectRef>
+          <a:fontRef idx="minor">
+            <a:schemeClr val="lt1"/>
+          </a:fontRef>
+        </p:style>
+        <p:txBody>
+          <a:bodyPr rtlCol="0" anchor="ctr"/>
+          <a:lstStyle/>
+          <a:p>
+            <a:pPr algn="ctr"/>
+            <a:r>
+              <a:rPr lang="en-US" dirty="0">
+                <a:solidFill>
+                  <a:schemeClr val="tx1"/>
+                </a:solidFill>
+              </a:rPr>
+              <a:t>Item collection</a:t>
+            </a:r>
+          </a:p>
+        </p:txBody>
+      </p:sp>
+      <p:cxnSp>
+        <p:nvCxnSpPr>
+          <p:cNvPr id="7" name="Connector: Curved 6">
+            <a:extLst>
+              <a:ext uri="{FF2B5EF4-FFF2-40B4-BE49-F238E27FC236}">
+                <a16:creationId xmlns:a16="http://schemas.microsoft.com/office/drawing/2014/main" id="{3F18A3CC-C703-0066-147E-6CAB1C64963B}"/>
+              </a:ext>
+            </a:extLst>
+          </p:cNvPr>
+          <p:cNvCxnSpPr>
+            <a:stCxn id="4" idx="3"/>
+            <a:endCxn id="5" idx="1"/>
+          </p:cNvCxnSpPr>
+          <p:nvPr/>
+        </p:nvCxnSpPr>
+        <p:spPr>
+          <a:xfrm flipV="1">
+            <a:off x="3367667" y="1106758"/>
+            <a:ext cx="2087136" cy="1"/>
+          </a:xfrm>
+          <a:prstGeom prst="curvedConnector3">
+            <a:avLst/>
+          </a:prstGeom>
+          <a:ln>
+            <a:tailEnd type="triangle"/>
+          </a:ln>
+        </p:spPr>
+        <p:style>
+          <a:lnRef idx="1">
+            <a:schemeClr val="accent1"/>
+          </a:lnRef>
+          <a:fillRef idx="0">
+            <a:schemeClr val="accent1"/>
+          </a:fillRef>
+          <a:effectRef idx="0">
+            <a:schemeClr val="accent1"/>
+          </a:effectRef>
+          <a:fontRef idx="minor">
+            <a:schemeClr val="tx1"/>
+          </a:fontRef>
+        </p:style>
+      </p:cxnSp>
+      <p:sp>
+        <p:nvSpPr>
+          <p:cNvPr id="9" name="TextBox 8">
+            <a:extLst>
+              <a:ext uri="{FF2B5EF4-FFF2-40B4-BE49-F238E27FC236}">
+                <a16:creationId xmlns:a16="http://schemas.microsoft.com/office/drawing/2014/main" id="{D5EF03FB-90CF-B9C0-D4EB-D2C36C0FF648}"/>
+              </a:ext>
+            </a:extLst>
+          </p:cNvPr>
+          <p:cNvSpPr txBox="1"/>
+          <p:nvPr/>
+        </p:nvSpPr>
+        <p:spPr>
+          <a:xfrm>
+            <a:off x="3367667" y="676275"/>
+            <a:ext cx="2087136" cy="692497"/>
+          </a:xfrm>
+          <a:prstGeom prst="rect">
+            <a:avLst/>
+          </a:prstGeom>
+          <a:noFill/>
+        </p:spPr>
+        <p:txBody>
+          <a:bodyPr wrap="square" rtlCol="0">
+            <a:spAutoFit/>
+          </a:bodyPr>
+          <a:lstStyle/>
+          <a:p>
+            <a:pPr algn="ctr"/>
+            <a:r>
+              <a:rPr lang="en-US" sz="1400" dirty="0"/>
+              <a:t>- </a:t>
+            </a:r>
+            <a:r>
+              <a:rPr lang="en-US" sz="1100" dirty="0"/>
+              <a:t>Mint item based on random-value of selected </a:t>
+            </a:r>
+            <a:r>
+              <a:rPr lang="en-US" sz="1100" dirty="0" err="1"/>
+              <a:t>lootbox</a:t>
+            </a:r>
+            <a:endParaRPr lang="en-US" sz="1100" dirty="0"/>
+          </a:p>
+          <a:p>
+            <a:pPr algn="ctr"/>
+            <a:r>
+              <a:rPr lang="en-US" sz="1400" dirty="0"/>
+              <a:t>- Burn </a:t>
+            </a:r>
+            <a:r>
+              <a:rPr lang="en-US" sz="1400" dirty="0" err="1"/>
+              <a:t>lootbox</a:t>
+            </a:r>
+            <a:endParaRPr lang="en-US" sz="1400" dirty="0"/>
+          </a:p>
+        </p:txBody>
+      </p:sp>
+    </p:spTree>
+    <p:extLst>
+      <p:ext uri="{BB962C8B-B14F-4D97-AF65-F5344CB8AC3E}">
+        <p14:creationId xmlns:p14="http://schemas.microsoft.com/office/powerpoint/2010/main" val="2471356082"/>
+      </p:ext>
+    </p:extLst>
+  </p:cSld>
+  <p:clrMapOvr>
+    <a:masterClrMapping/>
+  </p:clrMapOvr>
+</p:sld>
+</file>
+
 <file path=ppt/theme/theme1.xml><?xml version="1.0" encoding="utf-8"?>
 <a:theme xmlns:a="http://schemas.openxmlformats.org/drawingml/2006/main" name="Office Theme">
   <a:themeElements>

</xml_diff>